<commit_message>
add IMG line to index.html
</commit_message>
<xml_diff>
--- a/_site/images/oyster_logo.pptx
+++ b/_site/images/oyster_logo.pptx
@@ -7,7 +7,7 @@
   <p:sldIdLst>
     <p:sldId id="256" r:id="rId2"/>
   </p:sldIdLst>
-  <p:sldSz cx="13716000" cy="4572000"/>
+  <p:sldSz cx="16459200" cy="4572000"/>
   <p:notesSz cx="6858000" cy="9144000"/>
   <p:defaultTextStyle>
     <a:defPPr>
@@ -136,8 +136,8 @@
         </p:nvSpPr>
         <p:spPr>
           <a:xfrm>
-            <a:off x="1028700" y="1420284"/>
-            <a:ext cx="11658600" cy="980017"/>
+            <a:off x="1234440" y="1420284"/>
+            <a:ext cx="13990320" cy="980017"/>
           </a:xfrm>
         </p:spPr>
         <p:txBody>
@@ -164,8 +164,8 @@
         </p:nvSpPr>
         <p:spPr>
           <a:xfrm>
-            <a:off x="2057400" y="2590800"/>
-            <a:ext cx="9601200" cy="1168400"/>
+            <a:off x="2468880" y="2590800"/>
+            <a:ext cx="11521440" cy="1168400"/>
           </a:xfrm>
         </p:spPr>
         <p:txBody>
@@ -548,8 +548,8 @@
         </p:nvSpPr>
         <p:spPr>
           <a:xfrm>
-            <a:off x="14916150" y="183093"/>
-            <a:ext cx="4629150" cy="3901017"/>
+            <a:off x="17899380" y="183094"/>
+            <a:ext cx="5554980" cy="3901017"/>
           </a:xfrm>
         </p:spPr>
         <p:txBody>
@@ -576,8 +576,8 @@
         </p:nvSpPr>
         <p:spPr>
           <a:xfrm>
-            <a:off x="1028700" y="183093"/>
-            <a:ext cx="13658850" cy="3901017"/>
+            <a:off x="1234440" y="183094"/>
+            <a:ext cx="16390620" cy="3901017"/>
           </a:xfrm>
         </p:spPr>
         <p:txBody>
@@ -898,8 +898,8 @@
         </p:nvSpPr>
         <p:spPr>
           <a:xfrm>
-            <a:off x="1083470" y="2937934"/>
-            <a:ext cx="11658600" cy="908050"/>
+            <a:off x="1300164" y="2937934"/>
+            <a:ext cx="13990320" cy="908050"/>
           </a:xfrm>
         </p:spPr>
         <p:txBody>
@@ -930,8 +930,8 @@
         </p:nvSpPr>
         <p:spPr>
           <a:xfrm>
-            <a:off x="1083470" y="1937809"/>
-            <a:ext cx="11658600" cy="1000125"/>
+            <a:off x="1300164" y="1937810"/>
+            <a:ext cx="13990320" cy="1000125"/>
           </a:xfrm>
         </p:spPr>
         <p:txBody>
@@ -1167,8 +1167,8 @@
         </p:nvSpPr>
         <p:spPr>
           <a:xfrm>
-            <a:off x="1028700" y="1066801"/>
-            <a:ext cx="9144000" cy="3017309"/>
+            <a:off x="1234440" y="1066802"/>
+            <a:ext cx="10972800" cy="3017309"/>
           </a:xfrm>
         </p:spPr>
         <p:txBody>
@@ -1252,8 +1252,8 @@
         </p:nvSpPr>
         <p:spPr>
           <a:xfrm>
-            <a:off x="10401300" y="1066801"/>
-            <a:ext cx="9144000" cy="3017309"/>
+            <a:off x="12481560" y="1066802"/>
+            <a:ext cx="10972800" cy="3017309"/>
           </a:xfrm>
         </p:spPr>
         <p:txBody>
@@ -1432,8 +1432,8 @@
         </p:nvSpPr>
         <p:spPr>
           <a:xfrm>
-            <a:off x="685800" y="183092"/>
-            <a:ext cx="12344400" cy="762000"/>
+            <a:off x="822960" y="183092"/>
+            <a:ext cx="14813280" cy="762000"/>
           </a:xfrm>
         </p:spPr>
         <p:txBody>
@@ -1464,8 +1464,8 @@
         </p:nvSpPr>
         <p:spPr>
           <a:xfrm>
-            <a:off x="685800" y="1023409"/>
-            <a:ext cx="6060282" cy="426508"/>
+            <a:off x="822960" y="1023409"/>
+            <a:ext cx="7272338" cy="426508"/>
           </a:xfrm>
         </p:spPr>
         <p:txBody>
@@ -1529,8 +1529,8 @@
         </p:nvSpPr>
         <p:spPr>
           <a:xfrm>
-            <a:off x="685800" y="1449917"/>
-            <a:ext cx="6060282" cy="2634192"/>
+            <a:off x="822960" y="1449917"/>
+            <a:ext cx="7272338" cy="2634192"/>
           </a:xfrm>
         </p:spPr>
         <p:txBody>
@@ -1614,8 +1614,8 @@
         </p:nvSpPr>
         <p:spPr>
           <a:xfrm>
-            <a:off x="6967539" y="1023409"/>
-            <a:ext cx="6062663" cy="426508"/>
+            <a:off x="8361047" y="1023409"/>
+            <a:ext cx="7275196" cy="426508"/>
           </a:xfrm>
         </p:spPr>
         <p:txBody>
@@ -1679,8 +1679,8 @@
         </p:nvSpPr>
         <p:spPr>
           <a:xfrm>
-            <a:off x="6967539" y="1449917"/>
-            <a:ext cx="6062663" cy="2634192"/>
+            <a:off x="8361047" y="1449917"/>
+            <a:ext cx="7275196" cy="2634192"/>
           </a:xfrm>
         </p:spPr>
         <p:txBody>
@@ -2072,8 +2072,8 @@
         </p:nvSpPr>
         <p:spPr>
           <a:xfrm>
-            <a:off x="685801" y="182033"/>
-            <a:ext cx="4512470" cy="774700"/>
+            <a:off x="822961" y="182033"/>
+            <a:ext cx="5414964" cy="774700"/>
           </a:xfrm>
         </p:spPr>
         <p:txBody>
@@ -2104,8 +2104,8 @@
         </p:nvSpPr>
         <p:spPr>
           <a:xfrm>
-            <a:off x="5362576" y="182035"/>
-            <a:ext cx="7667625" cy="3902075"/>
+            <a:off x="6435092" y="182036"/>
+            <a:ext cx="9201150" cy="3902075"/>
           </a:xfrm>
         </p:spPr>
         <p:txBody>
@@ -2189,8 +2189,8 @@
         </p:nvSpPr>
         <p:spPr>
           <a:xfrm>
-            <a:off x="685801" y="956735"/>
-            <a:ext cx="4512470" cy="3127375"/>
+            <a:off x="822961" y="956736"/>
+            <a:ext cx="5414964" cy="3127375"/>
           </a:xfrm>
         </p:spPr>
         <p:txBody>
@@ -2349,8 +2349,8 @@
         </p:nvSpPr>
         <p:spPr>
           <a:xfrm>
-            <a:off x="2688432" y="3200400"/>
-            <a:ext cx="8229600" cy="377825"/>
+            <a:off x="3226118" y="3200401"/>
+            <a:ext cx="9875520" cy="377825"/>
           </a:xfrm>
         </p:spPr>
         <p:txBody>
@@ -2381,8 +2381,8 @@
         </p:nvSpPr>
         <p:spPr>
           <a:xfrm>
-            <a:off x="2688432" y="408517"/>
-            <a:ext cx="8229600" cy="2743200"/>
+            <a:off x="3226118" y="408517"/>
+            <a:ext cx="9875520" cy="2743200"/>
           </a:xfrm>
         </p:spPr>
         <p:txBody>
@@ -2442,8 +2442,8 @@
         </p:nvSpPr>
         <p:spPr>
           <a:xfrm>
-            <a:off x="2688432" y="3578225"/>
-            <a:ext cx="8229600" cy="536575"/>
+            <a:off x="3226118" y="3578226"/>
+            <a:ext cx="9875520" cy="536575"/>
           </a:xfrm>
         </p:spPr>
         <p:txBody>
@@ -2607,8 +2607,8 @@
         </p:nvSpPr>
         <p:spPr>
           <a:xfrm>
-            <a:off x="685800" y="183092"/>
-            <a:ext cx="12344400" cy="762000"/>
+            <a:off x="822960" y="183092"/>
+            <a:ext cx="14813280" cy="762000"/>
           </a:xfrm>
           <a:prstGeom prst="rect">
             <a:avLst/>
@@ -2640,8 +2640,8 @@
         </p:nvSpPr>
         <p:spPr>
           <a:xfrm>
-            <a:off x="685800" y="1066801"/>
-            <a:ext cx="12344400" cy="3017309"/>
+            <a:off x="822960" y="1066802"/>
+            <a:ext cx="14813280" cy="3017309"/>
           </a:xfrm>
           <a:prstGeom prst="rect">
             <a:avLst/>
@@ -2702,8 +2702,8 @@
         </p:nvSpPr>
         <p:spPr>
           <a:xfrm>
-            <a:off x="685800" y="4237568"/>
-            <a:ext cx="3200400" cy="243417"/>
+            <a:off x="822960" y="4237569"/>
+            <a:ext cx="3840480" cy="243417"/>
           </a:xfrm>
           <a:prstGeom prst="rect">
             <a:avLst/>
@@ -2743,8 +2743,8 @@
         </p:nvSpPr>
         <p:spPr>
           <a:xfrm>
-            <a:off x="4686300" y="4237568"/>
-            <a:ext cx="4343400" cy="243417"/>
+            <a:off x="5623560" y="4237569"/>
+            <a:ext cx="5212080" cy="243417"/>
           </a:xfrm>
           <a:prstGeom prst="rect">
             <a:avLst/>
@@ -2780,8 +2780,8 @@
         </p:nvSpPr>
         <p:spPr>
           <a:xfrm>
-            <a:off x="9829800" y="4237568"/>
-            <a:ext cx="3200400" cy="243417"/>
+            <a:off x="11795760" y="4237569"/>
+            <a:ext cx="3840480" cy="243417"/>
           </a:xfrm>
           <a:prstGeom prst="rect">
             <a:avLst/>
@@ -3102,7 +3102,7 @@
       </p:grpSpPr>
       <p:pic>
         <p:nvPicPr>
-          <p:cNvPr id="14" name="Picture 13" descr="oyster_photo.jpg"/>
+          <p:cNvPr id="5" name="Picture 4" descr="oyster_photo.jpg"/>
           <p:cNvPicPr>
             <a:picLocks noChangeAspect="1"/>
           </p:cNvPicPr>
@@ -3131,7 +3131,7 @@
         </p:blipFill>
         <p:spPr>
           <a:xfrm>
-            <a:off x="5432351" y="522934"/>
+            <a:off x="6919977" y="507558"/>
             <a:ext cx="2670453" cy="3509069"/>
           </a:xfrm>
           <a:prstGeom prst="rect">
@@ -3141,23 +3141,21 @@
       </p:pic>
       <p:cxnSp>
         <p:nvCxnSpPr>
-          <p:cNvPr id="15" name="Straight Connector 14"/>
-          <p:cNvCxnSpPr>
-            <a:stCxn id="14" idx="3"/>
-          </p:cNvCxnSpPr>
+          <p:cNvPr id="6" name="Straight Connector 5"/>
+          <p:cNvCxnSpPr/>
           <p:nvPr/>
         </p:nvCxnSpPr>
         <p:spPr>
           <a:xfrm flipV="1">
-            <a:off x="8102804" y="2269781"/>
-            <a:ext cx="4789352" cy="7688"/>
+            <a:off x="9556564" y="2246717"/>
+            <a:ext cx="6885703" cy="15376"/>
           </a:xfrm>
           <a:prstGeom prst="line">
             <a:avLst/>
           </a:prstGeom>
-          <a:ln w="38100" cmpd="sng">
+          <a:ln w="76200" cap="rnd" cmpd="sng">
             <a:solidFill>
-              <a:schemeClr val="tx2">
+              <a:schemeClr val="accent1">
                 <a:lumMod val="60000"/>
                 <a:lumOff val="40000"/>
               </a:schemeClr>
@@ -3182,21 +3180,21 @@
       </p:cxnSp>
       <p:cxnSp>
         <p:nvCxnSpPr>
-          <p:cNvPr id="16" name="Straight Connector 15"/>
+          <p:cNvPr id="13" name="Straight Connector 12"/>
           <p:cNvCxnSpPr/>
           <p:nvPr/>
         </p:nvCxnSpPr>
         <p:spPr>
           <a:xfrm flipV="1">
-            <a:off x="675149" y="2262093"/>
-            <a:ext cx="4789352" cy="7688"/>
+            <a:off x="50799" y="2225924"/>
+            <a:ext cx="6885703" cy="15376"/>
           </a:xfrm>
           <a:prstGeom prst="line">
             <a:avLst/>
           </a:prstGeom>
-          <a:ln w="38100" cmpd="sng">
+          <a:ln w="76200" cap="rnd" cmpd="sng">
             <a:solidFill>
-              <a:schemeClr val="tx2">
+              <a:schemeClr val="accent1">
                 <a:lumMod val="60000"/>
                 <a:lumOff val="40000"/>
               </a:schemeClr>

</xml_diff>